<commit_message>
add updated pptx file
</commit_message>
<xml_diff>
--- a/Tutorials/whatiswot/6-JSON_Schema_in_Practice/6.JSON Schema in Practice.pptx
+++ b/Tutorials/whatiswot/6-JSON_Schema_in_Practice/6.JSON Schema in Practice.pptx
@@ -248,7 +248,7 @@
           <a:p>
             <a:fld id="{13D04914-C2D3-4F6E-9724-F68824787271}" type="datetimeFigureOut">
               <a:rPr lang="en-US" smtClean="0"/>
-              <a:t>10/16/23</a:t>
+              <a:t>11/3/23</a:t>
             </a:fld>
             <a:endParaRPr lang="en-US"/>
           </a:p>
@@ -4829,7 +4829,7 @@
           <a:p>
             <a:fld id="{E81D2DD5-AB34-4770-8994-7B1025545EF3}" type="datetimeFigureOut">
               <a:rPr lang="en-US" smtClean="0"/>
-              <a:t>10/16/23</a:t>
+              <a:t>11/3/23</a:t>
             </a:fld>
             <a:endParaRPr lang="en-US"/>
           </a:p>
@@ -4999,7 +4999,7 @@
           <a:p>
             <a:fld id="{E81D2DD5-AB34-4770-8994-7B1025545EF3}" type="datetimeFigureOut">
               <a:rPr lang="en-US" smtClean="0"/>
-              <a:t>10/16/23</a:t>
+              <a:t>11/3/23</a:t>
             </a:fld>
             <a:endParaRPr lang="en-US"/>
           </a:p>
@@ -5179,7 +5179,7 @@
           <a:p>
             <a:fld id="{E81D2DD5-AB34-4770-8994-7B1025545EF3}" type="datetimeFigureOut">
               <a:rPr lang="en-US" smtClean="0"/>
-              <a:t>10/16/23</a:t>
+              <a:t>11/3/23</a:t>
             </a:fld>
             <a:endParaRPr lang="en-US"/>
           </a:p>
@@ -5349,7 +5349,7 @@
           <a:p>
             <a:fld id="{E81D2DD5-AB34-4770-8994-7B1025545EF3}" type="datetimeFigureOut">
               <a:rPr lang="en-US" smtClean="0"/>
-              <a:t>10/16/23</a:t>
+              <a:t>11/3/23</a:t>
             </a:fld>
             <a:endParaRPr lang="en-US"/>
           </a:p>
@@ -5595,7 +5595,7 @@
           <a:p>
             <a:fld id="{E81D2DD5-AB34-4770-8994-7B1025545EF3}" type="datetimeFigureOut">
               <a:rPr lang="en-US" smtClean="0"/>
-              <a:t>10/16/23</a:t>
+              <a:t>11/3/23</a:t>
             </a:fld>
             <a:endParaRPr lang="en-US"/>
           </a:p>
@@ -5827,7 +5827,7 @@
           <a:p>
             <a:fld id="{E81D2DD5-AB34-4770-8994-7B1025545EF3}" type="datetimeFigureOut">
               <a:rPr lang="en-US" smtClean="0"/>
-              <a:t>10/16/23</a:t>
+              <a:t>11/3/23</a:t>
             </a:fld>
             <a:endParaRPr lang="en-US"/>
           </a:p>
@@ -6194,7 +6194,7 @@
           <a:p>
             <a:fld id="{E81D2DD5-AB34-4770-8994-7B1025545EF3}" type="datetimeFigureOut">
               <a:rPr lang="en-US" smtClean="0"/>
-              <a:t>10/16/23</a:t>
+              <a:t>11/3/23</a:t>
             </a:fld>
             <a:endParaRPr lang="en-US"/>
           </a:p>
@@ -6312,7 +6312,7 @@
           <a:p>
             <a:fld id="{E81D2DD5-AB34-4770-8994-7B1025545EF3}" type="datetimeFigureOut">
               <a:rPr lang="en-US" smtClean="0"/>
-              <a:t>10/16/23</a:t>
+              <a:t>11/3/23</a:t>
             </a:fld>
             <a:endParaRPr lang="en-US"/>
           </a:p>
@@ -6407,7 +6407,7 @@
           <a:p>
             <a:fld id="{E81D2DD5-AB34-4770-8994-7B1025545EF3}" type="datetimeFigureOut">
               <a:rPr lang="en-US" smtClean="0"/>
-              <a:t>10/16/23</a:t>
+              <a:t>11/3/23</a:t>
             </a:fld>
             <a:endParaRPr lang="en-US"/>
           </a:p>
@@ -6684,7 +6684,7 @@
           <a:p>
             <a:fld id="{E81D2DD5-AB34-4770-8994-7B1025545EF3}" type="datetimeFigureOut">
               <a:rPr lang="en-US" smtClean="0"/>
-              <a:t>10/16/23</a:t>
+              <a:t>11/3/23</a:t>
             </a:fld>
             <a:endParaRPr lang="en-US"/>
           </a:p>
@@ -6941,7 +6941,7 @@
           <a:p>
             <a:fld id="{E81D2DD5-AB34-4770-8994-7B1025545EF3}" type="datetimeFigureOut">
               <a:rPr lang="en-US" smtClean="0"/>
-              <a:t>10/16/23</a:t>
+              <a:t>11/3/23</a:t>
             </a:fld>
             <a:endParaRPr lang="en-US"/>
           </a:p>
@@ -7159,7 +7159,7 @@
           <a:p>
             <a:fld id="{E81D2DD5-AB34-4770-8994-7B1025545EF3}" type="datetimeFigureOut">
               <a:rPr lang="en-US" smtClean="0"/>
-              <a:t>10/16/23</a:t>
+              <a:t>11/3/23</a:t>
             </a:fld>
             <a:endParaRPr lang="en-US"/>
           </a:p>
@@ -10807,13 +10807,13 @@
   <p:clrMapOvr>
     <a:masterClrMapping/>
   </p:clrMapOvr>
-  <mc:AlternateContent xmlns:mc="http://schemas.openxmlformats.org/markup-compatibility/2006">
-    <mc:Choice xmlns:p14="http://schemas.microsoft.com/office/powerpoint/2010/main" Requires="p14">
+  <mc:AlternateContent xmlns:mc="http://schemas.openxmlformats.org/markup-compatibility/2006" xmlns:p14="http://schemas.microsoft.com/office/powerpoint/2010/main">
+    <mc:Choice Requires="p14">
       <p:transition spd="slow" p14:dur="1500" advTm="11500">
         <p:push dir="u"/>
       </p:transition>
     </mc:Choice>
-    <mc:Fallback>
+    <mc:Fallback xmlns="">
       <p:transition spd="slow" advTm="11500">
         <p:push dir="u"/>
       </p:transition>
@@ -16626,13 +16626,13 @@
   <p:clrMapOvr>
     <a:masterClrMapping/>
   </p:clrMapOvr>
-  <mc:AlternateContent xmlns:mc="http://schemas.openxmlformats.org/markup-compatibility/2006">
-    <mc:Choice xmlns:p159="http://schemas.microsoft.com/office/powerpoint/2015/09/main" Requires="p159">
+  <mc:AlternateContent xmlns:mc="http://schemas.openxmlformats.org/markup-compatibility/2006" xmlns:p159="http://schemas.microsoft.com/office/powerpoint/2015/09/main">
+    <mc:Choice Requires="p159">
       <p:transition xmlns:p14="http://schemas.microsoft.com/office/powerpoint/2010/main" spd="slow" p14:dur="2000" advClick="0" advTm="21500">
         <p159:morph option="byObject"/>
       </p:transition>
     </mc:Choice>
-    <mc:Fallback>
+    <mc:Fallback xmlns="">
       <p:transition spd="slow" advClick="0" advTm="21500">
         <p:fade/>
       </p:transition>
@@ -18500,13 +18500,13 @@
   <p:clrMapOvr>
     <a:masterClrMapping/>
   </p:clrMapOvr>
-  <mc:AlternateContent xmlns:mc="http://schemas.openxmlformats.org/markup-compatibility/2006">
-    <mc:Choice xmlns:p159="http://schemas.microsoft.com/office/powerpoint/2015/09/main" Requires="p159">
+  <mc:AlternateContent xmlns:mc="http://schemas.openxmlformats.org/markup-compatibility/2006" xmlns:p159="http://schemas.microsoft.com/office/powerpoint/2015/09/main">
+    <mc:Choice Requires="p159">
       <p:transition xmlns:p14="http://schemas.microsoft.com/office/powerpoint/2010/main" spd="slow" p14:dur="2000" advClick="0" advTm="21000">
         <p159:morph option="byObject"/>
       </p:transition>
     </mc:Choice>
-    <mc:Fallback>
+    <mc:Fallback xmlns="">
       <p:transition spd="slow" advClick="0" advTm="21000">
         <p:fade/>
       </p:transition>
@@ -20995,13 +20995,13 @@
   <p:clrMapOvr>
     <a:masterClrMapping/>
   </p:clrMapOvr>
-  <mc:AlternateContent xmlns:mc="http://schemas.openxmlformats.org/markup-compatibility/2006">
-    <mc:Choice xmlns:p159="http://schemas.microsoft.com/office/powerpoint/2015/09/main" Requires="p159">
+  <mc:AlternateContent xmlns:mc="http://schemas.openxmlformats.org/markup-compatibility/2006" xmlns:p159="http://schemas.microsoft.com/office/powerpoint/2015/09/main">
+    <mc:Choice Requires="p159">
       <p:transition xmlns:p14="http://schemas.microsoft.com/office/powerpoint/2010/main" spd="slow" p14:dur="2000" advClick="0" advTm="16500">
         <p159:morph option="byObject"/>
       </p:transition>
     </mc:Choice>
-    <mc:Fallback>
+    <mc:Fallback xmlns="">
       <p:transition spd="slow" advClick="0" advTm="16500">
         <p:fade/>
       </p:transition>
@@ -24345,13 +24345,13 @@
   <p:clrMapOvr>
     <a:masterClrMapping/>
   </p:clrMapOvr>
-  <mc:AlternateContent xmlns:mc="http://schemas.openxmlformats.org/markup-compatibility/2006">
-    <mc:Choice xmlns:p159="http://schemas.microsoft.com/office/powerpoint/2015/09/main" Requires="p159">
+  <mc:AlternateContent xmlns:mc="http://schemas.openxmlformats.org/markup-compatibility/2006" xmlns:p159="http://schemas.microsoft.com/office/powerpoint/2015/09/main">
+    <mc:Choice Requires="p159">
       <p:transition xmlns:p14="http://schemas.microsoft.com/office/powerpoint/2010/main" spd="slow" p14:dur="2000" advClick="0" advTm="21000">
         <p159:morph option="byObject"/>
       </p:transition>
     </mc:Choice>
-    <mc:Fallback>
+    <mc:Fallback xmlns="">
       <p:transition spd="slow" advClick="0" advTm="21000">
         <p:fade/>
       </p:transition>
@@ -26096,13 +26096,13 @@
   <p:clrMapOvr>
     <a:masterClrMapping/>
   </p:clrMapOvr>
-  <mc:AlternateContent xmlns:mc="http://schemas.openxmlformats.org/markup-compatibility/2006">
-    <mc:Choice xmlns:p159="http://schemas.microsoft.com/office/powerpoint/2015/09/main" Requires="p159">
+  <mc:AlternateContent xmlns:mc="http://schemas.openxmlformats.org/markup-compatibility/2006" xmlns:p159="http://schemas.microsoft.com/office/powerpoint/2015/09/main">
+    <mc:Choice Requires="p159">
       <p:transition xmlns:p14="http://schemas.microsoft.com/office/powerpoint/2010/main" spd="slow" p14:dur="2000" advTm="12500">
         <p159:morph option="byObject"/>
       </p:transition>
     </mc:Choice>
-    <mc:Fallback>
+    <mc:Fallback xmlns="">
       <p:transition spd="slow" advTm="12500">
         <p:fade/>
       </p:transition>
@@ -28042,13 +28042,13 @@
   <p:clrMapOvr>
     <a:masterClrMapping/>
   </p:clrMapOvr>
-  <mc:AlternateContent xmlns:mc="http://schemas.openxmlformats.org/markup-compatibility/2006">
-    <mc:Choice xmlns:p14="http://schemas.microsoft.com/office/powerpoint/2010/main" Requires="p14">
+  <mc:AlternateContent xmlns:mc="http://schemas.openxmlformats.org/markup-compatibility/2006" xmlns:p14="http://schemas.microsoft.com/office/powerpoint/2010/main">
+    <mc:Choice Requires="p14">
       <p:transition spd="med" p14:dur="700" advTm="7500">
         <p:fade/>
       </p:transition>
     </mc:Choice>
-    <mc:Fallback>
+    <mc:Fallback xmlns="">
       <p:transition spd="med" advTm="7500">
         <p:fade/>
       </p:transition>
@@ -30176,11 +30176,11 @@
   <p:clrMapOvr>
     <a:masterClrMapping/>
   </p:clrMapOvr>
-  <mc:AlternateContent xmlns:mc="http://schemas.openxmlformats.org/markup-compatibility/2006">
-    <mc:Choice xmlns:p14="http://schemas.microsoft.com/office/powerpoint/2010/main" Requires="p14">
+  <mc:AlternateContent xmlns:mc="http://schemas.openxmlformats.org/markup-compatibility/2006" xmlns:p14="http://schemas.microsoft.com/office/powerpoint/2010/main">
+    <mc:Choice Requires="p14">
       <p:transition spd="slow" p14:dur="2000" advTm="22000"/>
     </mc:Choice>
-    <mc:Fallback>
+    <mc:Fallback xmlns="">
       <p:transition spd="slow" advTm="22000"/>
     </mc:Fallback>
   </mc:AlternateContent>
@@ -33363,13 +33363,13 @@
   <p:clrMapOvr>
     <a:masterClrMapping/>
   </p:clrMapOvr>
-  <mc:AlternateContent xmlns:mc="http://schemas.openxmlformats.org/markup-compatibility/2006">
-    <mc:Choice xmlns:p159="http://schemas.microsoft.com/office/powerpoint/2015/09/main" Requires="p159">
+  <mc:AlternateContent xmlns:mc="http://schemas.openxmlformats.org/markup-compatibility/2006" xmlns:p159="http://schemas.microsoft.com/office/powerpoint/2015/09/main">
+    <mc:Choice Requires="p159">
       <p:transition xmlns:p14="http://schemas.microsoft.com/office/powerpoint/2010/main" spd="slow" p14:dur="2000" advTm="3000">
         <p159:morph option="byObject"/>
       </p:transition>
     </mc:Choice>
-    <mc:Fallback>
+    <mc:Fallback xmlns="">
       <p:transition spd="slow" advTm="3000">
         <p:fade/>
       </p:transition>
@@ -33910,7 +33910,7 @@
                 </a:solidFill>
                 <a:latin typeface="Century Gothic" panose="020B0502020202020204" pitchFamily="34" charset="0"/>
               </a:rPr>
-              <a:t>/hth1mBvygBpviKVDIRgBANZBGIxshkQwGQzOATqVpQpQATTJxg59LIIEKMCBKMAC/KSAR3EgMneQPp5MWCH53wCoPYEvwA0lUkGVkDn0XhsCphI1gnPYPMTgRNJZP4nd1gAqC/woTiKNu2No6OtoCITgCiQaScCQ/WJGGo9GpgM8GBj+g/47vBEHAhE6hsGLY/S2i/BPmb+rGEHwzT2JkNI7xa8VwJDo14qfc/PvafhCJSqDSqN89ggCeQARZ7KmsmhFIG5gdxt7K3AzrgrCFe4+EsIPg7JA0aWG0DW2WP4yprRGgZ6gDoOCH1admJH8TKCQEZk3lZaXPlADniQZRwpH/1eHBJIhBivxPMZ5A8sez6uBPJyNdSYRQOmhl+pcRDPH+wAJAGqAFgKEAGOYXiGQF3+gdFoxiwXBSoiPJEBnA44hUMJqAB+EXbyQVdxgEaBQ6GB35</a:t>
+              <a:t>/hth1mBvygBpviKVDIRgBANZBGIxshkQwGQzOATqVpQpQATTJxg59LIIEKMCBKMAC/KSAR3EgMneQPp5MWCH53wCoPYEvwA0lUkGVkDn0XhsCphI1gnPYPMTgRNJZP4nd1gAqC/woTiKNu2No6OtoCITgCiQaScCQ/WJGGo9GpgM8GBj+g/47vBEHAhE6hsGLY/S2i/BPmb+rGEHwzT2JkNI7xa8VwJDo14qfc/PvafhCJSqDSqN89ggCeQARZ7KmsmhFIG5gdxt7K3AzrgrCFe4+EsIPg7JA0aWG0DW2WP4yprRGgZ6gDoOCH1admJH8TKCQEZk3lZaXPlADniQZRwpH/1eHBJIhBivxPMZ5A8sez6uBPJyNdSYRQOmhl+pcRDPH+wAJAGqAFgKEAGOYXiGQF3+gdFoxiwXBSoiPJEBnA44hUMJqAB+EXbyQVdxgEaBQ6GB35=</a:t>
             </a:r>
           </a:p>
         </p:txBody>
@@ -33925,14 +33925,14 @@
   <p:clrMapOvr>
     <a:masterClrMapping/>
   </p:clrMapOvr>
-  <mc:AlternateContent xmlns:mc="http://schemas.openxmlformats.org/markup-compatibility/2006" xmlns:p159="http://schemas.microsoft.com/office/powerpoint/2015/09/main">
-    <mc:Choice Requires="p159">
-      <p:transition xmlns:p14="http://schemas.microsoft.com/office/powerpoint/2010/main" spd="slow" p14:dur="2000" advTm="4000">
+  <mc:AlternateContent xmlns:mc="http://schemas.openxmlformats.org/markup-compatibility/2006">
+    <mc:Choice xmlns:p159="http://schemas.microsoft.com/office/powerpoint/2015/09/main" Requires="p159">
+      <p:transition xmlns:p14="http://schemas.microsoft.com/office/powerpoint/2010/main" spd="slow" p14:dur="2000" advTm="6000">
         <p159:morph option="byObject"/>
       </p:transition>
     </mc:Choice>
-    <mc:Fallback xmlns="">
-      <p:transition spd="slow" advTm="4000">
+    <mc:Fallback>
+      <p:transition spd="slow" advTm="6000">
         <p:fade/>
       </p:transition>
     </mc:Fallback>
@@ -36799,11 +36799,11 @@
   <p:clrMapOvr>
     <a:masterClrMapping/>
   </p:clrMapOvr>
-  <mc:AlternateContent xmlns:mc="http://schemas.openxmlformats.org/markup-compatibility/2006">
-    <mc:Choice xmlns:p14="http://schemas.microsoft.com/office/powerpoint/2010/main" Requires="p14">
+  <mc:AlternateContent xmlns:mc="http://schemas.openxmlformats.org/markup-compatibility/2006" xmlns:p14="http://schemas.microsoft.com/office/powerpoint/2010/main">
+    <mc:Choice Requires="p14">
       <p:transition spd="slow" p14:dur="2000" advClick="0" advTm="7000"/>
     </mc:Choice>
-    <mc:Fallback>
+    <mc:Fallback xmlns="">
       <p:transition spd="slow" advClick="0" advTm="7000"/>
     </mc:Fallback>
   </mc:AlternateContent>
@@ -43734,13 +43734,13 @@
   <p:clrMapOvr>
     <a:masterClrMapping/>
   </p:clrMapOvr>
-  <mc:AlternateContent xmlns:mc="http://schemas.openxmlformats.org/markup-compatibility/2006">
-    <mc:Choice xmlns:p159="http://schemas.microsoft.com/office/powerpoint/2015/09/main" Requires="p159">
+  <mc:AlternateContent xmlns:mc="http://schemas.openxmlformats.org/markup-compatibility/2006" xmlns:p159="http://schemas.microsoft.com/office/powerpoint/2015/09/main">
+    <mc:Choice Requires="p159">
       <p:transition spd="slow" advClick="0" advTm="9000">
         <p159:morph option="byObject"/>
       </p:transition>
     </mc:Choice>
-    <mc:Fallback>
+    <mc:Fallback xmlns="">
       <p:transition spd="slow" advClick="0" advTm="9000">
         <p:fade/>
       </p:transition>

</xml_diff>